<commit_message>
Updated splash screen and updated about dialog.
</commit_message>
<xml_diff>
--- a/Documentation/Splash Screen.pptx
+++ b/Documentation/Splash Screen.pptx
@@ -241,7 +241,7 @@
           <a:p>
             <a:fld id="{4050F5BB-B44B-4CC3-B745-09289CFE36AD}" type="datetimeFigureOut">
               <a:rPr lang="en-US" smtClean="0"/>
-              <a:t>11/23/2020</a:t>
+              <a:t>2/3/2021</a:t>
             </a:fld>
             <a:endParaRPr lang="en-US"/>
           </a:p>
@@ -409,7 +409,7 @@
           <a:p>
             <a:fld id="{4050F5BB-B44B-4CC3-B745-09289CFE36AD}" type="datetimeFigureOut">
               <a:rPr lang="en-US" smtClean="0"/>
-              <a:t>11/23/2020</a:t>
+              <a:t>2/3/2021</a:t>
             </a:fld>
             <a:endParaRPr lang="en-US"/>
           </a:p>
@@ -587,7 +587,7 @@
           <a:p>
             <a:fld id="{4050F5BB-B44B-4CC3-B745-09289CFE36AD}" type="datetimeFigureOut">
               <a:rPr lang="en-US" smtClean="0"/>
-              <a:t>11/23/2020</a:t>
+              <a:t>2/3/2021</a:t>
             </a:fld>
             <a:endParaRPr lang="en-US"/>
           </a:p>
@@ -755,7 +755,7 @@
           <a:p>
             <a:fld id="{4050F5BB-B44B-4CC3-B745-09289CFE36AD}" type="datetimeFigureOut">
               <a:rPr lang="en-US" smtClean="0"/>
-              <a:t>11/23/2020</a:t>
+              <a:t>2/3/2021</a:t>
             </a:fld>
             <a:endParaRPr lang="en-US"/>
           </a:p>
@@ -1000,7 +1000,7 @@
           <a:p>
             <a:fld id="{4050F5BB-B44B-4CC3-B745-09289CFE36AD}" type="datetimeFigureOut">
               <a:rPr lang="en-US" smtClean="0"/>
-              <a:t>11/23/2020</a:t>
+              <a:t>2/3/2021</a:t>
             </a:fld>
             <a:endParaRPr lang="en-US"/>
           </a:p>
@@ -1229,7 +1229,7 @@
           <a:p>
             <a:fld id="{4050F5BB-B44B-4CC3-B745-09289CFE36AD}" type="datetimeFigureOut">
               <a:rPr lang="en-US" smtClean="0"/>
-              <a:t>11/23/2020</a:t>
+              <a:t>2/3/2021</a:t>
             </a:fld>
             <a:endParaRPr lang="en-US"/>
           </a:p>
@@ -1593,7 +1593,7 @@
           <a:p>
             <a:fld id="{4050F5BB-B44B-4CC3-B745-09289CFE36AD}" type="datetimeFigureOut">
               <a:rPr lang="en-US" smtClean="0"/>
-              <a:t>11/23/2020</a:t>
+              <a:t>2/3/2021</a:t>
             </a:fld>
             <a:endParaRPr lang="en-US"/>
           </a:p>
@@ -1710,7 +1710,7 @@
           <a:p>
             <a:fld id="{4050F5BB-B44B-4CC3-B745-09289CFE36AD}" type="datetimeFigureOut">
               <a:rPr lang="en-US" smtClean="0"/>
-              <a:t>11/23/2020</a:t>
+              <a:t>2/3/2021</a:t>
             </a:fld>
             <a:endParaRPr lang="en-US"/>
           </a:p>
@@ -1805,7 +1805,7 @@
           <a:p>
             <a:fld id="{4050F5BB-B44B-4CC3-B745-09289CFE36AD}" type="datetimeFigureOut">
               <a:rPr lang="en-US" smtClean="0"/>
-              <a:t>11/23/2020</a:t>
+              <a:t>2/3/2021</a:t>
             </a:fld>
             <a:endParaRPr lang="en-US"/>
           </a:p>
@@ -2080,7 +2080,7 @@
           <a:p>
             <a:fld id="{4050F5BB-B44B-4CC3-B745-09289CFE36AD}" type="datetimeFigureOut">
               <a:rPr lang="en-US" smtClean="0"/>
-              <a:t>11/23/2020</a:t>
+              <a:t>2/3/2021</a:t>
             </a:fld>
             <a:endParaRPr lang="en-US"/>
           </a:p>
@@ -2332,7 +2332,7 @@
           <a:p>
             <a:fld id="{4050F5BB-B44B-4CC3-B745-09289CFE36AD}" type="datetimeFigureOut">
               <a:rPr lang="en-US" smtClean="0"/>
-              <a:t>11/23/2020</a:t>
+              <a:t>2/3/2021</a:t>
             </a:fld>
             <a:endParaRPr lang="en-US"/>
           </a:p>
@@ -2543,7 +2543,7 @@
           <a:p>
             <a:fld id="{4050F5BB-B44B-4CC3-B745-09289CFE36AD}" type="datetimeFigureOut">
               <a:rPr lang="en-US" smtClean="0"/>
-              <a:t>11/23/2020</a:t>
+              <a:t>2/3/2021</a:t>
             </a:fld>
             <a:endParaRPr lang="en-US"/>
           </a:p>
@@ -3094,7 +3094,7 @@
                   </a:outerShdw>
                 </a:effectLst>
               </a:rPr>
-              <a:t>version 1.2</a:t>
+              <a:t>version 1.3</a:t>
             </a:r>
           </a:p>
           <a:p>
@@ -3210,41 +3210,7 @@
                   </a:schemeClr>
                 </a:solidFill>
               </a:rPr>
-              <a:t>Copyright </a:t>
-            </a:r>
-            <a:r>
-              <a:rPr lang="en-US" sz="2800" spc="200">
-                <a:ln>
-                  <a:solidFill>
-                    <a:schemeClr val="bg1">
-                      <a:lumMod val="85000"/>
-                    </a:schemeClr>
-                  </a:solidFill>
-                </a:ln>
-                <a:solidFill>
-                  <a:schemeClr val="bg1">
-                    <a:lumMod val="85000"/>
-                  </a:schemeClr>
-                </a:solidFill>
-              </a:rPr>
-              <a:t>© 2020, </a:t>
-            </a:r>
-            <a:r>
-              <a:rPr lang="en-US" sz="2800" spc="200" dirty="0">
-                <a:ln>
-                  <a:solidFill>
-                    <a:schemeClr val="bg1">
-                      <a:lumMod val="85000"/>
-                    </a:schemeClr>
-                  </a:solidFill>
-                </a:ln>
-                <a:solidFill>
-                  <a:schemeClr val="bg1">
-                    <a:lumMod val="85000"/>
-                  </a:schemeClr>
-                </a:solidFill>
-              </a:rPr>
-              <a:t>All rights reserved</a:t>
+              <a:t>Copyright © 2021, All rights reserved</a:t>
             </a:r>
           </a:p>
         </p:txBody>

</xml_diff>

<commit_message>
Updated version to 1.4. Updated release notes.
</commit_message>
<xml_diff>
--- a/Documentation/Splash Screen.pptx
+++ b/Documentation/Splash Screen.pptx
@@ -241,7 +241,7 @@
           <a:p>
             <a:fld id="{4050F5BB-B44B-4CC3-B745-09289CFE36AD}" type="datetimeFigureOut">
               <a:rPr lang="en-US" smtClean="0"/>
-              <a:t>2/3/2021</a:t>
+              <a:t>3/25/2021</a:t>
             </a:fld>
             <a:endParaRPr lang="en-US"/>
           </a:p>
@@ -409,7 +409,7 @@
           <a:p>
             <a:fld id="{4050F5BB-B44B-4CC3-B745-09289CFE36AD}" type="datetimeFigureOut">
               <a:rPr lang="en-US" smtClean="0"/>
-              <a:t>2/3/2021</a:t>
+              <a:t>3/25/2021</a:t>
             </a:fld>
             <a:endParaRPr lang="en-US"/>
           </a:p>
@@ -587,7 +587,7 @@
           <a:p>
             <a:fld id="{4050F5BB-B44B-4CC3-B745-09289CFE36AD}" type="datetimeFigureOut">
               <a:rPr lang="en-US" smtClean="0"/>
-              <a:t>2/3/2021</a:t>
+              <a:t>3/25/2021</a:t>
             </a:fld>
             <a:endParaRPr lang="en-US"/>
           </a:p>
@@ -755,7 +755,7 @@
           <a:p>
             <a:fld id="{4050F5BB-B44B-4CC3-B745-09289CFE36AD}" type="datetimeFigureOut">
               <a:rPr lang="en-US" smtClean="0"/>
-              <a:t>2/3/2021</a:t>
+              <a:t>3/25/2021</a:t>
             </a:fld>
             <a:endParaRPr lang="en-US"/>
           </a:p>
@@ -1000,7 +1000,7 @@
           <a:p>
             <a:fld id="{4050F5BB-B44B-4CC3-B745-09289CFE36AD}" type="datetimeFigureOut">
               <a:rPr lang="en-US" smtClean="0"/>
-              <a:t>2/3/2021</a:t>
+              <a:t>3/25/2021</a:t>
             </a:fld>
             <a:endParaRPr lang="en-US"/>
           </a:p>
@@ -1229,7 +1229,7 @@
           <a:p>
             <a:fld id="{4050F5BB-B44B-4CC3-B745-09289CFE36AD}" type="datetimeFigureOut">
               <a:rPr lang="en-US" smtClean="0"/>
-              <a:t>2/3/2021</a:t>
+              <a:t>3/25/2021</a:t>
             </a:fld>
             <a:endParaRPr lang="en-US"/>
           </a:p>
@@ -1593,7 +1593,7 @@
           <a:p>
             <a:fld id="{4050F5BB-B44B-4CC3-B745-09289CFE36AD}" type="datetimeFigureOut">
               <a:rPr lang="en-US" smtClean="0"/>
-              <a:t>2/3/2021</a:t>
+              <a:t>3/25/2021</a:t>
             </a:fld>
             <a:endParaRPr lang="en-US"/>
           </a:p>
@@ -1710,7 +1710,7 @@
           <a:p>
             <a:fld id="{4050F5BB-B44B-4CC3-B745-09289CFE36AD}" type="datetimeFigureOut">
               <a:rPr lang="en-US" smtClean="0"/>
-              <a:t>2/3/2021</a:t>
+              <a:t>3/25/2021</a:t>
             </a:fld>
             <a:endParaRPr lang="en-US"/>
           </a:p>
@@ -1805,7 +1805,7 @@
           <a:p>
             <a:fld id="{4050F5BB-B44B-4CC3-B745-09289CFE36AD}" type="datetimeFigureOut">
               <a:rPr lang="en-US" smtClean="0"/>
-              <a:t>2/3/2021</a:t>
+              <a:t>3/25/2021</a:t>
             </a:fld>
             <a:endParaRPr lang="en-US"/>
           </a:p>
@@ -2080,7 +2080,7 @@
           <a:p>
             <a:fld id="{4050F5BB-B44B-4CC3-B745-09289CFE36AD}" type="datetimeFigureOut">
               <a:rPr lang="en-US" smtClean="0"/>
-              <a:t>2/3/2021</a:t>
+              <a:t>3/25/2021</a:t>
             </a:fld>
             <a:endParaRPr lang="en-US"/>
           </a:p>
@@ -2332,7 +2332,7 @@
           <a:p>
             <a:fld id="{4050F5BB-B44B-4CC3-B745-09289CFE36AD}" type="datetimeFigureOut">
               <a:rPr lang="en-US" smtClean="0"/>
-              <a:t>2/3/2021</a:t>
+              <a:t>3/25/2021</a:t>
             </a:fld>
             <a:endParaRPr lang="en-US"/>
           </a:p>
@@ -2543,7 +2543,7 @@
           <a:p>
             <a:fld id="{4050F5BB-B44B-4CC3-B745-09289CFE36AD}" type="datetimeFigureOut">
               <a:rPr lang="en-US" smtClean="0"/>
-              <a:t>2/3/2021</a:t>
+              <a:t>3/25/2021</a:t>
             </a:fld>
             <a:endParaRPr lang="en-US"/>
           </a:p>
@@ -3077,7 +3077,7 @@
           </a:p>
           <a:p>
             <a:r>
-              <a:rPr lang="en-US" sz="3200" spc="500" dirty="0">
+              <a:rPr lang="en-US" sz="3200" spc="500">
                 <a:ln>
                   <a:solidFill>
                     <a:schemeClr val="bg1"/>
@@ -3094,8 +3094,25 @@
                   </a:outerShdw>
                 </a:effectLst>
               </a:rPr>
-              <a:t>version 1.3</a:t>
-            </a:r>
+              <a:t>version 1.4</a:t>
+            </a:r>
+            <a:endParaRPr lang="en-US" sz="3200" spc="500" dirty="0">
+              <a:ln>
+                <a:solidFill>
+                  <a:schemeClr val="bg1"/>
+                </a:solidFill>
+              </a:ln>
+              <a:solidFill>
+                <a:schemeClr val="bg1"/>
+              </a:solidFill>
+              <a:effectLst>
+                <a:outerShdw blurRad="50800" dist="38100" algn="l" rotWithShape="0">
+                  <a:prstClr val="black">
+                    <a:alpha val="40000"/>
+                  </a:prstClr>
+                </a:outerShdw>
+              </a:effectLst>
+            </a:endParaRPr>
           </a:p>
           <a:p>
             <a:pPr algn="ctr"/>

</xml_diff>

<commit_message>
Update splash screen powerpoint.
</commit_message>
<xml_diff>
--- a/Documentation/Splash Screen.pptx
+++ b/Documentation/Splash Screen.pptx
@@ -241,7 +241,7 @@
           <a:p>
             <a:fld id="{4050F5BB-B44B-4CC3-B745-09289CFE36AD}" type="datetimeFigureOut">
               <a:rPr lang="en-US" smtClean="0"/>
-              <a:t>2/3/2021</a:t>
+              <a:t>3/25/2021</a:t>
             </a:fld>
             <a:endParaRPr lang="en-US"/>
           </a:p>
@@ -409,7 +409,7 @@
           <a:p>
             <a:fld id="{4050F5BB-B44B-4CC3-B745-09289CFE36AD}" type="datetimeFigureOut">
               <a:rPr lang="en-US" smtClean="0"/>
-              <a:t>2/3/2021</a:t>
+              <a:t>3/25/2021</a:t>
             </a:fld>
             <a:endParaRPr lang="en-US"/>
           </a:p>
@@ -587,7 +587,7 @@
           <a:p>
             <a:fld id="{4050F5BB-B44B-4CC3-B745-09289CFE36AD}" type="datetimeFigureOut">
               <a:rPr lang="en-US" smtClean="0"/>
-              <a:t>2/3/2021</a:t>
+              <a:t>3/25/2021</a:t>
             </a:fld>
             <a:endParaRPr lang="en-US"/>
           </a:p>
@@ -755,7 +755,7 @@
           <a:p>
             <a:fld id="{4050F5BB-B44B-4CC3-B745-09289CFE36AD}" type="datetimeFigureOut">
               <a:rPr lang="en-US" smtClean="0"/>
-              <a:t>2/3/2021</a:t>
+              <a:t>3/25/2021</a:t>
             </a:fld>
             <a:endParaRPr lang="en-US"/>
           </a:p>
@@ -1000,7 +1000,7 @@
           <a:p>
             <a:fld id="{4050F5BB-B44B-4CC3-B745-09289CFE36AD}" type="datetimeFigureOut">
               <a:rPr lang="en-US" smtClean="0"/>
-              <a:t>2/3/2021</a:t>
+              <a:t>3/25/2021</a:t>
             </a:fld>
             <a:endParaRPr lang="en-US"/>
           </a:p>
@@ -1229,7 +1229,7 @@
           <a:p>
             <a:fld id="{4050F5BB-B44B-4CC3-B745-09289CFE36AD}" type="datetimeFigureOut">
               <a:rPr lang="en-US" smtClean="0"/>
-              <a:t>2/3/2021</a:t>
+              <a:t>3/25/2021</a:t>
             </a:fld>
             <a:endParaRPr lang="en-US"/>
           </a:p>
@@ -1593,7 +1593,7 @@
           <a:p>
             <a:fld id="{4050F5BB-B44B-4CC3-B745-09289CFE36AD}" type="datetimeFigureOut">
               <a:rPr lang="en-US" smtClean="0"/>
-              <a:t>2/3/2021</a:t>
+              <a:t>3/25/2021</a:t>
             </a:fld>
             <a:endParaRPr lang="en-US"/>
           </a:p>
@@ -1710,7 +1710,7 @@
           <a:p>
             <a:fld id="{4050F5BB-B44B-4CC3-B745-09289CFE36AD}" type="datetimeFigureOut">
               <a:rPr lang="en-US" smtClean="0"/>
-              <a:t>2/3/2021</a:t>
+              <a:t>3/25/2021</a:t>
             </a:fld>
             <a:endParaRPr lang="en-US"/>
           </a:p>
@@ -1805,7 +1805,7 @@
           <a:p>
             <a:fld id="{4050F5BB-B44B-4CC3-B745-09289CFE36AD}" type="datetimeFigureOut">
               <a:rPr lang="en-US" smtClean="0"/>
-              <a:t>2/3/2021</a:t>
+              <a:t>3/25/2021</a:t>
             </a:fld>
             <a:endParaRPr lang="en-US"/>
           </a:p>
@@ -2080,7 +2080,7 @@
           <a:p>
             <a:fld id="{4050F5BB-B44B-4CC3-B745-09289CFE36AD}" type="datetimeFigureOut">
               <a:rPr lang="en-US" smtClean="0"/>
-              <a:t>2/3/2021</a:t>
+              <a:t>3/25/2021</a:t>
             </a:fld>
             <a:endParaRPr lang="en-US"/>
           </a:p>
@@ -2332,7 +2332,7 @@
           <a:p>
             <a:fld id="{4050F5BB-B44B-4CC3-B745-09289CFE36AD}" type="datetimeFigureOut">
               <a:rPr lang="en-US" smtClean="0"/>
-              <a:t>2/3/2021</a:t>
+              <a:t>3/25/2021</a:t>
             </a:fld>
             <a:endParaRPr lang="en-US"/>
           </a:p>
@@ -2543,7 +2543,7 @@
           <a:p>
             <a:fld id="{4050F5BB-B44B-4CC3-B745-09289CFE36AD}" type="datetimeFigureOut">
               <a:rPr lang="en-US" smtClean="0"/>
-              <a:t>2/3/2021</a:t>
+              <a:t>3/25/2021</a:t>
             </a:fld>
             <a:endParaRPr lang="en-US"/>
           </a:p>
@@ -3077,7 +3077,7 @@
           </a:p>
           <a:p>
             <a:r>
-              <a:rPr lang="en-US" sz="3200" spc="500" dirty="0">
+              <a:rPr lang="en-US" sz="3200" spc="500">
                 <a:ln>
                   <a:solidFill>
                     <a:schemeClr val="bg1"/>
@@ -3094,8 +3094,25 @@
                   </a:outerShdw>
                 </a:effectLst>
               </a:rPr>
-              <a:t>version 1.3</a:t>
-            </a:r>
+              <a:t>version 1.4</a:t>
+            </a:r>
+            <a:endParaRPr lang="en-US" sz="3200" spc="500" dirty="0">
+              <a:ln>
+                <a:solidFill>
+                  <a:schemeClr val="bg1"/>
+                </a:solidFill>
+              </a:ln>
+              <a:solidFill>
+                <a:schemeClr val="bg1"/>
+              </a:solidFill>
+              <a:effectLst>
+                <a:outerShdw blurRad="50800" dist="38100" algn="l" rotWithShape="0">
+                  <a:prstClr val="black">
+                    <a:alpha val="40000"/>
+                  </a:prstClr>
+                </a:outerShdw>
+              </a:effectLst>
+            </a:endParaRPr>
           </a:p>
           <a:p>
             <a:pPr algn="ctr"/>

</xml_diff>

<commit_message>
compiling tiff image. getting real world dimensions.
</commit_message>
<xml_diff>
--- a/Documentation/Splash Screen.pptx
+++ b/Documentation/Splash Screen.pptx
@@ -241,7 +241,7 @@
           <a:p>
             <a:fld id="{4050F5BB-B44B-4CC3-B745-09289CFE36AD}" type="datetimeFigureOut">
               <a:rPr lang="en-US" smtClean="0"/>
-              <a:t>2/3/2021</a:t>
+              <a:t>3/25/2021</a:t>
             </a:fld>
             <a:endParaRPr lang="en-US"/>
           </a:p>
@@ -409,7 +409,7 @@
           <a:p>
             <a:fld id="{4050F5BB-B44B-4CC3-B745-09289CFE36AD}" type="datetimeFigureOut">
               <a:rPr lang="en-US" smtClean="0"/>
-              <a:t>2/3/2021</a:t>
+              <a:t>3/25/2021</a:t>
             </a:fld>
             <a:endParaRPr lang="en-US"/>
           </a:p>
@@ -587,7 +587,7 @@
           <a:p>
             <a:fld id="{4050F5BB-B44B-4CC3-B745-09289CFE36AD}" type="datetimeFigureOut">
               <a:rPr lang="en-US" smtClean="0"/>
-              <a:t>2/3/2021</a:t>
+              <a:t>3/25/2021</a:t>
             </a:fld>
             <a:endParaRPr lang="en-US"/>
           </a:p>
@@ -755,7 +755,7 @@
           <a:p>
             <a:fld id="{4050F5BB-B44B-4CC3-B745-09289CFE36AD}" type="datetimeFigureOut">
               <a:rPr lang="en-US" smtClean="0"/>
-              <a:t>2/3/2021</a:t>
+              <a:t>3/25/2021</a:t>
             </a:fld>
             <a:endParaRPr lang="en-US"/>
           </a:p>
@@ -1000,7 +1000,7 @@
           <a:p>
             <a:fld id="{4050F5BB-B44B-4CC3-B745-09289CFE36AD}" type="datetimeFigureOut">
               <a:rPr lang="en-US" smtClean="0"/>
-              <a:t>2/3/2021</a:t>
+              <a:t>3/25/2021</a:t>
             </a:fld>
             <a:endParaRPr lang="en-US"/>
           </a:p>
@@ -1229,7 +1229,7 @@
           <a:p>
             <a:fld id="{4050F5BB-B44B-4CC3-B745-09289CFE36AD}" type="datetimeFigureOut">
               <a:rPr lang="en-US" smtClean="0"/>
-              <a:t>2/3/2021</a:t>
+              <a:t>3/25/2021</a:t>
             </a:fld>
             <a:endParaRPr lang="en-US"/>
           </a:p>
@@ -1593,7 +1593,7 @@
           <a:p>
             <a:fld id="{4050F5BB-B44B-4CC3-B745-09289CFE36AD}" type="datetimeFigureOut">
               <a:rPr lang="en-US" smtClean="0"/>
-              <a:t>2/3/2021</a:t>
+              <a:t>3/25/2021</a:t>
             </a:fld>
             <a:endParaRPr lang="en-US"/>
           </a:p>
@@ -1710,7 +1710,7 @@
           <a:p>
             <a:fld id="{4050F5BB-B44B-4CC3-B745-09289CFE36AD}" type="datetimeFigureOut">
               <a:rPr lang="en-US" smtClean="0"/>
-              <a:t>2/3/2021</a:t>
+              <a:t>3/25/2021</a:t>
             </a:fld>
             <a:endParaRPr lang="en-US"/>
           </a:p>
@@ -1805,7 +1805,7 @@
           <a:p>
             <a:fld id="{4050F5BB-B44B-4CC3-B745-09289CFE36AD}" type="datetimeFigureOut">
               <a:rPr lang="en-US" smtClean="0"/>
-              <a:t>2/3/2021</a:t>
+              <a:t>3/25/2021</a:t>
             </a:fld>
             <a:endParaRPr lang="en-US"/>
           </a:p>
@@ -2080,7 +2080,7 @@
           <a:p>
             <a:fld id="{4050F5BB-B44B-4CC3-B745-09289CFE36AD}" type="datetimeFigureOut">
               <a:rPr lang="en-US" smtClean="0"/>
-              <a:t>2/3/2021</a:t>
+              <a:t>3/25/2021</a:t>
             </a:fld>
             <a:endParaRPr lang="en-US"/>
           </a:p>
@@ -2332,7 +2332,7 @@
           <a:p>
             <a:fld id="{4050F5BB-B44B-4CC3-B745-09289CFE36AD}" type="datetimeFigureOut">
               <a:rPr lang="en-US" smtClean="0"/>
-              <a:t>2/3/2021</a:t>
+              <a:t>3/25/2021</a:t>
             </a:fld>
             <a:endParaRPr lang="en-US"/>
           </a:p>
@@ -2543,7 +2543,7 @@
           <a:p>
             <a:fld id="{4050F5BB-B44B-4CC3-B745-09289CFE36AD}" type="datetimeFigureOut">
               <a:rPr lang="en-US" smtClean="0"/>
-              <a:t>2/3/2021</a:t>
+              <a:t>3/25/2021</a:t>
             </a:fld>
             <a:endParaRPr lang="en-US"/>
           </a:p>
@@ -3077,7 +3077,7 @@
           </a:p>
           <a:p>
             <a:r>
-              <a:rPr lang="en-US" sz="3200" spc="500" dirty="0">
+              <a:rPr lang="en-US" sz="3200" spc="500">
                 <a:ln>
                   <a:solidFill>
                     <a:schemeClr val="bg1"/>
@@ -3094,8 +3094,25 @@
                   </a:outerShdw>
                 </a:effectLst>
               </a:rPr>
-              <a:t>version 1.3</a:t>
-            </a:r>
+              <a:t>version 1.4</a:t>
+            </a:r>
+            <a:endParaRPr lang="en-US" sz="3200" spc="500" dirty="0">
+              <a:ln>
+                <a:solidFill>
+                  <a:schemeClr val="bg1"/>
+                </a:solidFill>
+              </a:ln>
+              <a:solidFill>
+                <a:schemeClr val="bg1"/>
+              </a:solidFill>
+              <a:effectLst>
+                <a:outerShdw blurRad="50800" dist="38100" algn="l" rotWithShape="0">
+                  <a:prstClr val="black">
+                    <a:alpha val="40000"/>
+                  </a:prstClr>
+                </a:outerShdw>
+              </a:effectLst>
+            </a:endParaRPr>
           </a:p>
           <a:p>
             <a:pPr algn="ctr"/>

</xml_diff>

<commit_message>
Updated version to 1.5. Updated release notes, user manual, and splash screens.
</commit_message>
<xml_diff>
--- a/Documentation/Splash Screen.pptx
+++ b/Documentation/Splash Screen.pptx
@@ -241,7 +241,7 @@
           <a:p>
             <a:fld id="{4050F5BB-B44B-4CC3-B745-09289CFE36AD}" type="datetimeFigureOut">
               <a:rPr lang="en-US" smtClean="0"/>
-              <a:t>3/25/2021</a:t>
+              <a:t>5/10/2021</a:t>
             </a:fld>
             <a:endParaRPr lang="en-US"/>
           </a:p>
@@ -409,7 +409,7 @@
           <a:p>
             <a:fld id="{4050F5BB-B44B-4CC3-B745-09289CFE36AD}" type="datetimeFigureOut">
               <a:rPr lang="en-US" smtClean="0"/>
-              <a:t>3/25/2021</a:t>
+              <a:t>5/10/2021</a:t>
             </a:fld>
             <a:endParaRPr lang="en-US"/>
           </a:p>
@@ -587,7 +587,7 @@
           <a:p>
             <a:fld id="{4050F5BB-B44B-4CC3-B745-09289CFE36AD}" type="datetimeFigureOut">
               <a:rPr lang="en-US" smtClean="0"/>
-              <a:t>3/25/2021</a:t>
+              <a:t>5/10/2021</a:t>
             </a:fld>
             <a:endParaRPr lang="en-US"/>
           </a:p>
@@ -755,7 +755,7 @@
           <a:p>
             <a:fld id="{4050F5BB-B44B-4CC3-B745-09289CFE36AD}" type="datetimeFigureOut">
               <a:rPr lang="en-US" smtClean="0"/>
-              <a:t>3/25/2021</a:t>
+              <a:t>5/10/2021</a:t>
             </a:fld>
             <a:endParaRPr lang="en-US"/>
           </a:p>
@@ -1000,7 +1000,7 @@
           <a:p>
             <a:fld id="{4050F5BB-B44B-4CC3-B745-09289CFE36AD}" type="datetimeFigureOut">
               <a:rPr lang="en-US" smtClean="0"/>
-              <a:t>3/25/2021</a:t>
+              <a:t>5/10/2021</a:t>
             </a:fld>
             <a:endParaRPr lang="en-US"/>
           </a:p>
@@ -1229,7 +1229,7 @@
           <a:p>
             <a:fld id="{4050F5BB-B44B-4CC3-B745-09289CFE36AD}" type="datetimeFigureOut">
               <a:rPr lang="en-US" smtClean="0"/>
-              <a:t>3/25/2021</a:t>
+              <a:t>5/10/2021</a:t>
             </a:fld>
             <a:endParaRPr lang="en-US"/>
           </a:p>
@@ -1593,7 +1593,7 @@
           <a:p>
             <a:fld id="{4050F5BB-B44B-4CC3-B745-09289CFE36AD}" type="datetimeFigureOut">
               <a:rPr lang="en-US" smtClean="0"/>
-              <a:t>3/25/2021</a:t>
+              <a:t>5/10/2021</a:t>
             </a:fld>
             <a:endParaRPr lang="en-US"/>
           </a:p>
@@ -1710,7 +1710,7 @@
           <a:p>
             <a:fld id="{4050F5BB-B44B-4CC3-B745-09289CFE36AD}" type="datetimeFigureOut">
               <a:rPr lang="en-US" smtClean="0"/>
-              <a:t>3/25/2021</a:t>
+              <a:t>5/10/2021</a:t>
             </a:fld>
             <a:endParaRPr lang="en-US"/>
           </a:p>
@@ -1805,7 +1805,7 @@
           <a:p>
             <a:fld id="{4050F5BB-B44B-4CC3-B745-09289CFE36AD}" type="datetimeFigureOut">
               <a:rPr lang="en-US" smtClean="0"/>
-              <a:t>3/25/2021</a:t>
+              <a:t>5/10/2021</a:t>
             </a:fld>
             <a:endParaRPr lang="en-US"/>
           </a:p>
@@ -2080,7 +2080,7 @@
           <a:p>
             <a:fld id="{4050F5BB-B44B-4CC3-B745-09289CFE36AD}" type="datetimeFigureOut">
               <a:rPr lang="en-US" smtClean="0"/>
-              <a:t>3/25/2021</a:t>
+              <a:t>5/10/2021</a:t>
             </a:fld>
             <a:endParaRPr lang="en-US"/>
           </a:p>
@@ -2332,7 +2332,7 @@
           <a:p>
             <a:fld id="{4050F5BB-B44B-4CC3-B745-09289CFE36AD}" type="datetimeFigureOut">
               <a:rPr lang="en-US" smtClean="0"/>
-              <a:t>3/25/2021</a:t>
+              <a:t>5/10/2021</a:t>
             </a:fld>
             <a:endParaRPr lang="en-US"/>
           </a:p>
@@ -2543,7 +2543,7 @@
           <a:p>
             <a:fld id="{4050F5BB-B44B-4CC3-B745-09289CFE36AD}" type="datetimeFigureOut">
               <a:rPr lang="en-US" smtClean="0"/>
-              <a:t>3/25/2021</a:t>
+              <a:t>5/10/2021</a:t>
             </a:fld>
             <a:endParaRPr lang="en-US"/>
           </a:p>
@@ -3077,7 +3077,7 @@
           </a:p>
           <a:p>
             <a:r>
-              <a:rPr lang="en-US" sz="3200" spc="500">
+              <a:rPr lang="en-US" sz="3200" spc="500" dirty="0">
                 <a:ln>
                   <a:solidFill>
                     <a:schemeClr val="bg1"/>
@@ -3094,25 +3094,8 @@
                   </a:outerShdw>
                 </a:effectLst>
               </a:rPr>
-              <a:t>version 1.4</a:t>
-            </a:r>
-            <a:endParaRPr lang="en-US" sz="3200" spc="500" dirty="0">
-              <a:ln>
-                <a:solidFill>
-                  <a:schemeClr val="bg1"/>
-                </a:solidFill>
-              </a:ln>
-              <a:solidFill>
-                <a:schemeClr val="bg1"/>
-              </a:solidFill>
-              <a:effectLst>
-                <a:outerShdw blurRad="50800" dist="38100" algn="l" rotWithShape="0">
-                  <a:prstClr val="black">
-                    <a:alpha val="40000"/>
-                  </a:prstClr>
-                </a:outerShdw>
-              </a:effectLst>
-            </a:endParaRPr>
+              <a:t>version 1.5</a:t>
+            </a:r>
           </a:p>
           <a:p>
             <a:pPr algn="ctr"/>

</xml_diff>

<commit_message>
Updated version to 1.6.1 and prepared for release.
</commit_message>
<xml_diff>
--- a/Documentation/Splash Screen.pptx
+++ b/Documentation/Splash Screen.pptx
@@ -241,7 +241,7 @@
           <a:p>
             <a:fld id="{4050F5BB-B44B-4CC3-B745-09289CFE36AD}" type="datetimeFigureOut">
               <a:rPr lang="en-US" smtClean="0"/>
-              <a:t>8/30/2021</a:t>
+              <a:t>9/28/2021</a:t>
             </a:fld>
             <a:endParaRPr lang="en-US"/>
           </a:p>
@@ -409,7 +409,7 @@
           <a:p>
             <a:fld id="{4050F5BB-B44B-4CC3-B745-09289CFE36AD}" type="datetimeFigureOut">
               <a:rPr lang="en-US" smtClean="0"/>
-              <a:t>8/30/2021</a:t>
+              <a:t>9/28/2021</a:t>
             </a:fld>
             <a:endParaRPr lang="en-US"/>
           </a:p>
@@ -587,7 +587,7 @@
           <a:p>
             <a:fld id="{4050F5BB-B44B-4CC3-B745-09289CFE36AD}" type="datetimeFigureOut">
               <a:rPr lang="en-US" smtClean="0"/>
-              <a:t>8/30/2021</a:t>
+              <a:t>9/28/2021</a:t>
             </a:fld>
             <a:endParaRPr lang="en-US"/>
           </a:p>
@@ -755,7 +755,7 @@
           <a:p>
             <a:fld id="{4050F5BB-B44B-4CC3-B745-09289CFE36AD}" type="datetimeFigureOut">
               <a:rPr lang="en-US" smtClean="0"/>
-              <a:t>8/30/2021</a:t>
+              <a:t>9/28/2021</a:t>
             </a:fld>
             <a:endParaRPr lang="en-US"/>
           </a:p>
@@ -1000,7 +1000,7 @@
           <a:p>
             <a:fld id="{4050F5BB-B44B-4CC3-B745-09289CFE36AD}" type="datetimeFigureOut">
               <a:rPr lang="en-US" smtClean="0"/>
-              <a:t>8/30/2021</a:t>
+              <a:t>9/28/2021</a:t>
             </a:fld>
             <a:endParaRPr lang="en-US"/>
           </a:p>
@@ -1229,7 +1229,7 @@
           <a:p>
             <a:fld id="{4050F5BB-B44B-4CC3-B745-09289CFE36AD}" type="datetimeFigureOut">
               <a:rPr lang="en-US" smtClean="0"/>
-              <a:t>8/30/2021</a:t>
+              <a:t>9/28/2021</a:t>
             </a:fld>
             <a:endParaRPr lang="en-US"/>
           </a:p>
@@ -1593,7 +1593,7 @@
           <a:p>
             <a:fld id="{4050F5BB-B44B-4CC3-B745-09289CFE36AD}" type="datetimeFigureOut">
               <a:rPr lang="en-US" smtClean="0"/>
-              <a:t>8/30/2021</a:t>
+              <a:t>9/28/2021</a:t>
             </a:fld>
             <a:endParaRPr lang="en-US"/>
           </a:p>
@@ -1710,7 +1710,7 @@
           <a:p>
             <a:fld id="{4050F5BB-B44B-4CC3-B745-09289CFE36AD}" type="datetimeFigureOut">
               <a:rPr lang="en-US" smtClean="0"/>
-              <a:t>8/30/2021</a:t>
+              <a:t>9/28/2021</a:t>
             </a:fld>
             <a:endParaRPr lang="en-US"/>
           </a:p>
@@ -1805,7 +1805,7 @@
           <a:p>
             <a:fld id="{4050F5BB-B44B-4CC3-B745-09289CFE36AD}" type="datetimeFigureOut">
               <a:rPr lang="en-US" smtClean="0"/>
-              <a:t>8/30/2021</a:t>
+              <a:t>9/28/2021</a:t>
             </a:fld>
             <a:endParaRPr lang="en-US"/>
           </a:p>
@@ -2080,7 +2080,7 @@
           <a:p>
             <a:fld id="{4050F5BB-B44B-4CC3-B745-09289CFE36AD}" type="datetimeFigureOut">
               <a:rPr lang="en-US" smtClean="0"/>
-              <a:t>8/30/2021</a:t>
+              <a:t>9/28/2021</a:t>
             </a:fld>
             <a:endParaRPr lang="en-US"/>
           </a:p>
@@ -2332,7 +2332,7 @@
           <a:p>
             <a:fld id="{4050F5BB-B44B-4CC3-B745-09289CFE36AD}" type="datetimeFigureOut">
               <a:rPr lang="en-US" smtClean="0"/>
-              <a:t>8/30/2021</a:t>
+              <a:t>9/28/2021</a:t>
             </a:fld>
             <a:endParaRPr lang="en-US"/>
           </a:p>
@@ -2543,7 +2543,7 @@
           <a:p>
             <a:fld id="{4050F5BB-B44B-4CC3-B745-09289CFE36AD}" type="datetimeFigureOut">
               <a:rPr lang="en-US" smtClean="0"/>
-              <a:t>8/30/2021</a:t>
+              <a:t>9/28/2021</a:t>
             </a:fld>
             <a:endParaRPr lang="en-US"/>
           </a:p>
@@ -3094,7 +3094,7 @@
                   </a:outerShdw>
                 </a:effectLst>
               </a:rPr>
-              <a:t>version 1.6</a:t>
+              <a:t>version 1.6.1</a:t>
             </a:r>
           </a:p>
           <a:p>

</xml_diff>